<commit_message>
Dodano nowe przykłady funkcji
</commit_message>
<xml_diff>
--- a/Wprowadzenie do funkcji/IV. Wprowadzenie do funkcji/Zadania.pptx
+++ b/Wprowadzenie do funkcji/IV. Wprowadzenie do funkcji/Zadania.pptx
@@ -282,7 +282,7 @@
             <a:fld id="{EE943B78-06A0-4E92-ADB6-4BAA084F345E}" type="datetimeFigureOut">
               <a:rPr lang="pl-PL" smtClean="0"/>
               <a:pPr/>
-              <a:t>15.05.2018</a:t>
+              <a:t>30.05.2018</a:t>
             </a:fld>
             <a:endParaRPr lang="pl-PL"/>
           </a:p>
@@ -482,7 +482,7 @@
             <a:fld id="{EE943B78-06A0-4E92-ADB6-4BAA084F345E}" type="datetimeFigureOut">
               <a:rPr lang="pl-PL" smtClean="0"/>
               <a:pPr/>
-              <a:t>15.05.2018</a:t>
+              <a:t>30.05.2018</a:t>
             </a:fld>
             <a:endParaRPr lang="pl-PL"/>
           </a:p>
@@ -692,7 +692,7 @@
             <a:fld id="{EE943B78-06A0-4E92-ADB6-4BAA084F345E}" type="datetimeFigureOut">
               <a:rPr lang="pl-PL" smtClean="0"/>
               <a:pPr/>
-              <a:t>15.05.2018</a:t>
+              <a:t>30.05.2018</a:t>
             </a:fld>
             <a:endParaRPr lang="pl-PL"/>
           </a:p>
@@ -892,7 +892,7 @@
             <a:fld id="{EE943B78-06A0-4E92-ADB6-4BAA084F345E}" type="datetimeFigureOut">
               <a:rPr lang="pl-PL" smtClean="0"/>
               <a:pPr/>
-              <a:t>15.05.2018</a:t>
+              <a:t>30.05.2018</a:t>
             </a:fld>
             <a:endParaRPr lang="pl-PL"/>
           </a:p>
@@ -1169,7 +1169,7 @@
             <a:fld id="{EE943B78-06A0-4E92-ADB6-4BAA084F345E}" type="datetimeFigureOut">
               <a:rPr lang="pl-PL" smtClean="0"/>
               <a:pPr/>
-              <a:t>15.05.2018</a:t>
+              <a:t>30.05.2018</a:t>
             </a:fld>
             <a:endParaRPr lang="pl-PL"/>
           </a:p>
@@ -1436,7 +1436,7 @@
             <a:fld id="{EE943B78-06A0-4E92-ADB6-4BAA084F345E}" type="datetimeFigureOut">
               <a:rPr lang="pl-PL" smtClean="0"/>
               <a:pPr/>
-              <a:t>15.05.2018</a:t>
+              <a:t>30.05.2018</a:t>
             </a:fld>
             <a:endParaRPr lang="pl-PL"/>
           </a:p>
@@ -1850,7 +1850,7 @@
             <a:fld id="{EE943B78-06A0-4E92-ADB6-4BAA084F345E}" type="datetimeFigureOut">
               <a:rPr lang="pl-PL" smtClean="0"/>
               <a:pPr/>
-              <a:t>15.05.2018</a:t>
+              <a:t>30.05.2018</a:t>
             </a:fld>
             <a:endParaRPr lang="pl-PL"/>
           </a:p>
@@ -1993,7 +1993,7 @@
             <a:fld id="{EE943B78-06A0-4E92-ADB6-4BAA084F345E}" type="datetimeFigureOut">
               <a:rPr lang="pl-PL" smtClean="0"/>
               <a:pPr/>
-              <a:t>15.05.2018</a:t>
+              <a:t>30.05.2018</a:t>
             </a:fld>
             <a:endParaRPr lang="pl-PL"/>
           </a:p>
@@ -2108,7 +2108,7 @@
             <a:fld id="{EE943B78-06A0-4E92-ADB6-4BAA084F345E}" type="datetimeFigureOut">
               <a:rPr lang="pl-PL" smtClean="0"/>
               <a:pPr/>
-              <a:t>15.05.2018</a:t>
+              <a:t>30.05.2018</a:t>
             </a:fld>
             <a:endParaRPr lang="pl-PL"/>
           </a:p>
@@ -2421,7 +2421,7 @@
             <a:fld id="{EE943B78-06A0-4E92-ADB6-4BAA084F345E}" type="datetimeFigureOut">
               <a:rPr lang="pl-PL" smtClean="0"/>
               <a:pPr/>
-              <a:t>15.05.2018</a:t>
+              <a:t>30.05.2018</a:t>
             </a:fld>
             <a:endParaRPr lang="pl-PL"/>
           </a:p>
@@ -2711,7 +2711,7 @@
             <a:fld id="{EE943B78-06A0-4E92-ADB6-4BAA084F345E}" type="datetimeFigureOut">
               <a:rPr lang="pl-PL" smtClean="0"/>
               <a:pPr/>
-              <a:t>15.05.2018</a:t>
+              <a:t>30.05.2018</a:t>
             </a:fld>
             <a:endParaRPr lang="pl-PL"/>
           </a:p>
@@ -2954,7 +2954,7 @@
             <a:fld id="{EE943B78-06A0-4E92-ADB6-4BAA084F345E}" type="datetimeFigureOut">
               <a:rPr lang="pl-PL" smtClean="0"/>
               <a:pPr/>
-              <a:t>15.05.2018</a:t>
+              <a:t>30.05.2018</a:t>
             </a:fld>
             <a:endParaRPr lang="pl-PL"/>
           </a:p>
@@ -5785,7 +5785,7 @@
           <p:nvPr>
             <p:extLst>
               <p:ext uri="{D42A27DB-BD31-4B8C-83A1-F6EECF244321}">
-                <p14:modId xmlns:p14="http://schemas.microsoft.com/office/powerpoint/2010/main" val="3686889824"/>
+                <p14:modId xmlns:p14="http://schemas.microsoft.com/office/powerpoint/2010/main" val="1783200185"/>
               </p:ext>
             </p:extLst>
           </p:nvPr>

</xml_diff>

<commit_message>
Dodano rozwiązania zadań z funkcjami oraz podzielono je na grupy
</commit_message>
<xml_diff>
--- a/Wprowadzenie do funkcji/IV. Wprowadzenie do funkcji/Zadania.pptx
+++ b/Wprowadzenie do funkcji/IV. Wprowadzenie do funkcji/Zadania.pptx
@@ -282,7 +282,7 @@
             <a:fld id="{EE943B78-06A0-4E92-ADB6-4BAA084F345E}" type="datetimeFigureOut">
               <a:rPr lang="pl-PL" smtClean="0"/>
               <a:pPr/>
-              <a:t>30.05.2018</a:t>
+              <a:t>04.06.2018</a:t>
             </a:fld>
             <a:endParaRPr lang="pl-PL"/>
           </a:p>
@@ -482,7 +482,7 @@
             <a:fld id="{EE943B78-06A0-4E92-ADB6-4BAA084F345E}" type="datetimeFigureOut">
               <a:rPr lang="pl-PL" smtClean="0"/>
               <a:pPr/>
-              <a:t>30.05.2018</a:t>
+              <a:t>04.06.2018</a:t>
             </a:fld>
             <a:endParaRPr lang="pl-PL"/>
           </a:p>
@@ -692,7 +692,7 @@
             <a:fld id="{EE943B78-06A0-4E92-ADB6-4BAA084F345E}" type="datetimeFigureOut">
               <a:rPr lang="pl-PL" smtClean="0"/>
               <a:pPr/>
-              <a:t>30.05.2018</a:t>
+              <a:t>04.06.2018</a:t>
             </a:fld>
             <a:endParaRPr lang="pl-PL"/>
           </a:p>
@@ -892,7 +892,7 @@
             <a:fld id="{EE943B78-06A0-4E92-ADB6-4BAA084F345E}" type="datetimeFigureOut">
               <a:rPr lang="pl-PL" smtClean="0"/>
               <a:pPr/>
-              <a:t>30.05.2018</a:t>
+              <a:t>04.06.2018</a:t>
             </a:fld>
             <a:endParaRPr lang="pl-PL"/>
           </a:p>
@@ -1169,7 +1169,7 @@
             <a:fld id="{EE943B78-06A0-4E92-ADB6-4BAA084F345E}" type="datetimeFigureOut">
               <a:rPr lang="pl-PL" smtClean="0"/>
               <a:pPr/>
-              <a:t>30.05.2018</a:t>
+              <a:t>04.06.2018</a:t>
             </a:fld>
             <a:endParaRPr lang="pl-PL"/>
           </a:p>
@@ -1436,7 +1436,7 @@
             <a:fld id="{EE943B78-06A0-4E92-ADB6-4BAA084F345E}" type="datetimeFigureOut">
               <a:rPr lang="pl-PL" smtClean="0"/>
               <a:pPr/>
-              <a:t>30.05.2018</a:t>
+              <a:t>04.06.2018</a:t>
             </a:fld>
             <a:endParaRPr lang="pl-PL"/>
           </a:p>
@@ -1850,7 +1850,7 @@
             <a:fld id="{EE943B78-06A0-4E92-ADB6-4BAA084F345E}" type="datetimeFigureOut">
               <a:rPr lang="pl-PL" smtClean="0"/>
               <a:pPr/>
-              <a:t>30.05.2018</a:t>
+              <a:t>04.06.2018</a:t>
             </a:fld>
             <a:endParaRPr lang="pl-PL"/>
           </a:p>
@@ -1993,7 +1993,7 @@
             <a:fld id="{EE943B78-06A0-4E92-ADB6-4BAA084F345E}" type="datetimeFigureOut">
               <a:rPr lang="pl-PL" smtClean="0"/>
               <a:pPr/>
-              <a:t>30.05.2018</a:t>
+              <a:t>04.06.2018</a:t>
             </a:fld>
             <a:endParaRPr lang="pl-PL"/>
           </a:p>
@@ -2108,7 +2108,7 @@
             <a:fld id="{EE943B78-06A0-4E92-ADB6-4BAA084F345E}" type="datetimeFigureOut">
               <a:rPr lang="pl-PL" smtClean="0"/>
               <a:pPr/>
-              <a:t>30.05.2018</a:t>
+              <a:t>04.06.2018</a:t>
             </a:fld>
             <a:endParaRPr lang="pl-PL"/>
           </a:p>
@@ -2421,7 +2421,7 @@
             <a:fld id="{EE943B78-06A0-4E92-ADB6-4BAA084F345E}" type="datetimeFigureOut">
               <a:rPr lang="pl-PL" smtClean="0"/>
               <a:pPr/>
-              <a:t>30.05.2018</a:t>
+              <a:t>04.06.2018</a:t>
             </a:fld>
             <a:endParaRPr lang="pl-PL"/>
           </a:p>
@@ -2711,7 +2711,7 @@
             <a:fld id="{EE943B78-06A0-4E92-ADB6-4BAA084F345E}" type="datetimeFigureOut">
               <a:rPr lang="pl-PL" smtClean="0"/>
               <a:pPr/>
-              <a:t>30.05.2018</a:t>
+              <a:t>04.06.2018</a:t>
             </a:fld>
             <a:endParaRPr lang="pl-PL"/>
           </a:p>
@@ -2954,7 +2954,7 @@
             <a:fld id="{EE943B78-06A0-4E92-ADB6-4BAA084F345E}" type="datetimeFigureOut">
               <a:rPr lang="pl-PL" smtClean="0"/>
               <a:pPr/>
-              <a:t>30.05.2018</a:t>
+              <a:t>04.06.2018</a:t>
             </a:fld>
             <a:endParaRPr lang="pl-PL"/>
           </a:p>
@@ -3987,7 +3987,7 @@
 </file>
 
 <file path=ppt/slides/slide3.xml><?xml version="1.0" encoding="utf-8"?>
-<p:sld xmlns:a="http://schemas.openxmlformats.org/drawingml/2006/main" xmlns:r="http://schemas.openxmlformats.org/officeDocument/2006/relationships" xmlns:p="http://schemas.openxmlformats.org/presentationml/2006/main" show="0">
+<p:sld xmlns:a="http://schemas.openxmlformats.org/drawingml/2006/main" xmlns:r="http://schemas.openxmlformats.org/officeDocument/2006/relationships" xmlns:p="http://schemas.openxmlformats.org/presentationml/2006/main">
   <p:cSld>
     <p:spTree>
       <p:nvGrpSpPr>
@@ -4637,6 +4637,41 @@
           </a:graphicData>
         </a:graphic>
       </p:graphicFrame>
+      <p:sp>
+        <p:nvSpPr>
+          <p:cNvPr id="10" name="pole tekstowe 9">
+            <a:extLst>
+              <a:ext uri="{FF2B5EF4-FFF2-40B4-BE49-F238E27FC236}">
+                <a16:creationId xmlns:a16="http://schemas.microsoft.com/office/drawing/2014/main" id="{337FA2BC-BB06-9C41-9C32-EEFD3F2DFA05}"/>
+              </a:ext>
+            </a:extLst>
+          </p:cNvPr>
+          <p:cNvSpPr txBox="1"/>
+          <p:nvPr/>
+        </p:nvSpPr>
+        <p:spPr>
+          <a:xfrm>
+            <a:off x="212426" y="133815"/>
+            <a:ext cx="1037656" cy="369332"/>
+          </a:xfrm>
+          <a:prstGeom prst="rect">
+            <a:avLst/>
+          </a:prstGeom>
+          <a:noFill/>
+        </p:spPr>
+        <p:txBody>
+          <a:bodyPr wrap="none" rtlCol="0">
+            <a:spAutoFit/>
+          </a:bodyPr>
+          <a:lstStyle/>
+          <a:p>
+            <a:r>
+              <a:rPr lang="pl-PL" b="1" dirty="0"/>
+              <a:t>Wersja A</a:t>
+            </a:r>
+          </a:p>
+        </p:txBody>
+      </p:sp>
     </p:spTree>
   </p:cSld>
   <p:clrMapOvr>
@@ -4646,7 +4681,7 @@
 </file>
 
 <file path=ppt/slides/slide4.xml><?xml version="1.0" encoding="utf-8"?>
-<p:sld xmlns:a="http://schemas.openxmlformats.org/drawingml/2006/main" xmlns:r="http://schemas.openxmlformats.org/officeDocument/2006/relationships" xmlns:p="http://schemas.openxmlformats.org/presentationml/2006/main" show="0">
+<p:sld xmlns:a="http://schemas.openxmlformats.org/drawingml/2006/main" xmlns:r="http://schemas.openxmlformats.org/officeDocument/2006/relationships" xmlns:p="http://schemas.openxmlformats.org/presentationml/2006/main">
   <p:cSld>
     <p:spTree>
       <p:nvGrpSpPr>
@@ -5295,6 +5330,41 @@
           </a:graphicData>
         </a:graphic>
       </p:graphicFrame>
+      <p:sp>
+        <p:nvSpPr>
+          <p:cNvPr id="10" name="pole tekstowe 9">
+            <a:extLst>
+              <a:ext uri="{FF2B5EF4-FFF2-40B4-BE49-F238E27FC236}">
+                <a16:creationId xmlns:a16="http://schemas.microsoft.com/office/drawing/2014/main" id="{86F30E3D-5BA5-D740-8D3F-41EA58869FEF}"/>
+              </a:ext>
+            </a:extLst>
+          </p:cNvPr>
+          <p:cNvSpPr txBox="1"/>
+          <p:nvPr/>
+        </p:nvSpPr>
+        <p:spPr>
+          <a:xfrm>
+            <a:off x="212426" y="133815"/>
+            <a:ext cx="1028038" cy="369332"/>
+          </a:xfrm>
+          <a:prstGeom prst="rect">
+            <a:avLst/>
+          </a:prstGeom>
+          <a:noFill/>
+        </p:spPr>
+        <p:txBody>
+          <a:bodyPr wrap="none" rtlCol="0">
+            <a:spAutoFit/>
+          </a:bodyPr>
+          <a:lstStyle/>
+          <a:p>
+            <a:r>
+              <a:rPr lang="pl-PL" b="1" dirty="0"/>
+              <a:t>Wersja B</a:t>
+            </a:r>
+          </a:p>
+        </p:txBody>
+      </p:sp>
     </p:spTree>
     <p:extLst>
       <p:ext uri="{BB962C8B-B14F-4D97-AF65-F5344CB8AC3E}">
@@ -5958,6 +6028,41 @@
           </a:graphicData>
         </a:graphic>
       </p:graphicFrame>
+      <p:sp>
+        <p:nvSpPr>
+          <p:cNvPr id="10" name="pole tekstowe 9">
+            <a:extLst>
+              <a:ext uri="{FF2B5EF4-FFF2-40B4-BE49-F238E27FC236}">
+                <a16:creationId xmlns:a16="http://schemas.microsoft.com/office/drawing/2014/main" id="{A20EE25A-D8EA-BE40-9D52-C496AC41F5C6}"/>
+              </a:ext>
+            </a:extLst>
+          </p:cNvPr>
+          <p:cNvSpPr txBox="1"/>
+          <p:nvPr/>
+        </p:nvSpPr>
+        <p:spPr>
+          <a:xfrm>
+            <a:off x="212426" y="133815"/>
+            <a:ext cx="1020023" cy="369332"/>
+          </a:xfrm>
+          <a:prstGeom prst="rect">
+            <a:avLst/>
+          </a:prstGeom>
+          <a:noFill/>
+        </p:spPr>
+        <p:txBody>
+          <a:bodyPr wrap="none" rtlCol="0">
+            <a:spAutoFit/>
+          </a:bodyPr>
+          <a:lstStyle/>
+          <a:p>
+            <a:r>
+              <a:rPr lang="pl-PL" b="1" dirty="0"/>
+              <a:t>Wersja C</a:t>
+            </a:r>
+          </a:p>
+        </p:txBody>
+      </p:sp>
     </p:spTree>
     <p:extLst>
       <p:ext uri="{BB962C8B-B14F-4D97-AF65-F5344CB8AC3E}">

</xml_diff>